<commit_message>
Edits to quarto demo presentation
</commit_message>
<xml_diff>
--- a/quartodemo/quartodemo.pptx
+++ b/quartodemo/quartodemo.pptx
@@ -5,7 +5,7 @@
     <p:sldMasterId id="2147483648" r:id="rId1"/>
   </p:sldMasterIdLst>
   <p:notesMasterIdLst>
-    <p:notesMasterId r:id="rId20"/>
+    <p:notesMasterId r:id="rId19"/>
   </p:notesMasterIdLst>
   <p:sldIdLst>
     <p:sldId id="256" r:id="rId2"/>
@@ -21,11 +21,10 @@
     <p:sldId id="263" r:id="rId12"/>
     <p:sldId id="268" r:id="rId13"/>
     <p:sldId id="264" r:id="rId14"/>
-    <p:sldId id="274" r:id="rId15"/>
-    <p:sldId id="267" r:id="rId16"/>
-    <p:sldId id="269" r:id="rId17"/>
-    <p:sldId id="271" r:id="rId18"/>
-    <p:sldId id="272" r:id="rId19"/>
+    <p:sldId id="267" r:id="rId15"/>
+    <p:sldId id="269" r:id="rId16"/>
+    <p:sldId id="271" r:id="rId17"/>
+    <p:sldId id="272" r:id="rId18"/>
   </p:sldIdLst>
   <p:sldSz cx="12192000" cy="6858000"/>
   <p:notesSz cx="6858000" cy="9144000"/>
@@ -145,12 +144,12 @@
   <pc:docChgLst>
     <pc:chgData name="Hartman, Rosemary@DWR" userId="984f44d5-4180-46ad-9b77-e367b17d9727" providerId="ADAL" clId="{1E617022-5496-44DE-BF3A-27228D12BFB1}"/>
     <pc:docChg chg="custSel addSld delSld modSld sldOrd">
-      <pc:chgData name="Hartman, Rosemary@DWR" userId="984f44d5-4180-46ad-9b77-e367b17d9727" providerId="ADAL" clId="{1E617022-5496-44DE-BF3A-27228D12BFB1}" dt="2024-04-16T19:00:24.050" v="1523" actId="20577"/>
+      <pc:chgData name="Hartman, Rosemary@DWR" userId="984f44d5-4180-46ad-9b77-e367b17d9727" providerId="ADAL" clId="{1E617022-5496-44DE-BF3A-27228D12BFB1}" dt="2024-04-18T03:46:48.303" v="1541" actId="47"/>
       <pc:docMkLst>
         <pc:docMk/>
       </pc:docMkLst>
       <pc:sldChg chg="modSp mod">
-        <pc:chgData name="Hartman, Rosemary@DWR" userId="984f44d5-4180-46ad-9b77-e367b17d9727" providerId="ADAL" clId="{1E617022-5496-44DE-BF3A-27228D12BFB1}" dt="2024-04-16T17:42:17.241" v="1149" actId="313"/>
+        <pc:chgData name="Hartman, Rosemary@DWR" userId="984f44d5-4180-46ad-9b77-e367b17d9727" providerId="ADAL" clId="{1E617022-5496-44DE-BF3A-27228D12BFB1}" dt="2024-04-18T03:35:46.740" v="1540" actId="20577"/>
         <pc:sldMkLst>
           <pc:docMk/>
           <pc:sldMk cId="248703479" sldId="256"/>
@@ -164,7 +163,7 @@
           </ac:spMkLst>
         </pc:spChg>
         <pc:spChg chg="mod">
-          <ac:chgData name="Hartman, Rosemary@DWR" userId="984f44d5-4180-46ad-9b77-e367b17d9727" providerId="ADAL" clId="{1E617022-5496-44DE-BF3A-27228D12BFB1}" dt="2024-04-16T17:42:17.241" v="1149" actId="313"/>
+          <ac:chgData name="Hartman, Rosemary@DWR" userId="984f44d5-4180-46ad-9b77-e367b17d9727" providerId="ADAL" clId="{1E617022-5496-44DE-BF3A-27228D12BFB1}" dt="2024-04-18T03:35:46.740" v="1540" actId="20577"/>
           <ac:spMkLst>
             <pc:docMk/>
             <pc:sldMk cId="248703479" sldId="256"/>
@@ -741,8 +740,8 @@
           </ac:spMkLst>
         </pc:spChg>
       </pc:sldChg>
-      <pc:sldChg chg="modSp new mod">
-        <pc:chgData name="Hartman, Rosemary@DWR" userId="984f44d5-4180-46ad-9b77-e367b17d9727" providerId="ADAL" clId="{1E617022-5496-44DE-BF3A-27228D12BFB1}" dt="2024-04-16T19:00:24.050" v="1523" actId="20577"/>
+      <pc:sldChg chg="modSp new del mod">
+        <pc:chgData name="Hartman, Rosemary@DWR" userId="984f44d5-4180-46ad-9b77-e367b17d9727" providerId="ADAL" clId="{1E617022-5496-44DE-BF3A-27228D12BFB1}" dt="2024-04-18T03:46:48.303" v="1541" actId="47"/>
         <pc:sldMkLst>
           <pc:docMk/>
           <pc:sldMk cId="1662011218" sldId="274"/>
@@ -843,7 +842,7 @@
           <a:p>
             <a:fld id="{27661C8C-4142-4BB9-A91E-1A3F9011B33B}" type="datetimeFigureOut">
               <a:rPr lang="en-US" smtClean="0"/>
-              <a:t>4/16/2024</a:t>
+              <a:t>4/17/2024</a:t>
             </a:fld>
             <a:endParaRPr lang="en-US"/>
           </a:p>
@@ -1900,7 +1899,7 @@
           <a:p>
             <a:fld id="{B1FB3334-BD21-46B5-BD0F-B2FD4441121D}" type="datetimeFigureOut">
               <a:rPr lang="en-US" smtClean="0"/>
-              <a:t>4/16/2024</a:t>
+              <a:t>4/17/2024</a:t>
             </a:fld>
             <a:endParaRPr lang="en-US"/>
           </a:p>
@@ -2098,7 +2097,7 @@
           <a:p>
             <a:fld id="{B1FB3334-BD21-46B5-BD0F-B2FD4441121D}" type="datetimeFigureOut">
               <a:rPr lang="en-US" smtClean="0"/>
-              <a:t>4/16/2024</a:t>
+              <a:t>4/17/2024</a:t>
             </a:fld>
             <a:endParaRPr lang="en-US"/>
           </a:p>
@@ -2306,7 +2305,7 @@
           <a:p>
             <a:fld id="{B1FB3334-BD21-46B5-BD0F-B2FD4441121D}" type="datetimeFigureOut">
               <a:rPr lang="en-US" smtClean="0"/>
-              <a:t>4/16/2024</a:t>
+              <a:t>4/17/2024</a:t>
             </a:fld>
             <a:endParaRPr lang="en-US"/>
           </a:p>
@@ -2504,7 +2503,7 @@
           <a:p>
             <a:fld id="{B1FB3334-BD21-46B5-BD0F-B2FD4441121D}" type="datetimeFigureOut">
               <a:rPr lang="en-US" smtClean="0"/>
-              <a:t>4/16/2024</a:t>
+              <a:t>4/17/2024</a:t>
             </a:fld>
             <a:endParaRPr lang="en-US"/>
           </a:p>
@@ -2779,7 +2778,7 @@
           <a:p>
             <a:fld id="{B1FB3334-BD21-46B5-BD0F-B2FD4441121D}" type="datetimeFigureOut">
               <a:rPr lang="en-US" smtClean="0"/>
-              <a:t>4/16/2024</a:t>
+              <a:t>4/17/2024</a:t>
             </a:fld>
             <a:endParaRPr lang="en-US"/>
           </a:p>
@@ -3044,7 +3043,7 @@
           <a:p>
             <a:fld id="{B1FB3334-BD21-46B5-BD0F-B2FD4441121D}" type="datetimeFigureOut">
               <a:rPr lang="en-US" smtClean="0"/>
-              <a:t>4/16/2024</a:t>
+              <a:t>4/17/2024</a:t>
             </a:fld>
             <a:endParaRPr lang="en-US"/>
           </a:p>
@@ -3456,7 +3455,7 @@
           <a:p>
             <a:fld id="{B1FB3334-BD21-46B5-BD0F-B2FD4441121D}" type="datetimeFigureOut">
               <a:rPr lang="en-US" smtClean="0"/>
-              <a:t>4/16/2024</a:t>
+              <a:t>4/17/2024</a:t>
             </a:fld>
             <a:endParaRPr lang="en-US"/>
           </a:p>
@@ -3597,7 +3596,7 @@
           <a:p>
             <a:fld id="{B1FB3334-BD21-46B5-BD0F-B2FD4441121D}" type="datetimeFigureOut">
               <a:rPr lang="en-US" smtClean="0"/>
-              <a:t>4/16/2024</a:t>
+              <a:t>4/17/2024</a:t>
             </a:fld>
             <a:endParaRPr lang="en-US"/>
           </a:p>
@@ -3710,7 +3709,7 @@
           <a:p>
             <a:fld id="{B1FB3334-BD21-46B5-BD0F-B2FD4441121D}" type="datetimeFigureOut">
               <a:rPr lang="en-US" smtClean="0"/>
-              <a:t>4/16/2024</a:t>
+              <a:t>4/17/2024</a:t>
             </a:fld>
             <a:endParaRPr lang="en-US"/>
           </a:p>
@@ -4021,7 +4020,7 @@
           <a:p>
             <a:fld id="{B1FB3334-BD21-46B5-BD0F-B2FD4441121D}" type="datetimeFigureOut">
               <a:rPr lang="en-US" smtClean="0"/>
-              <a:t>4/16/2024</a:t>
+              <a:t>4/17/2024</a:t>
             </a:fld>
             <a:endParaRPr lang="en-US"/>
           </a:p>
@@ -4309,7 +4308,7 @@
           <a:p>
             <a:fld id="{B1FB3334-BD21-46B5-BD0F-B2FD4441121D}" type="datetimeFigureOut">
               <a:rPr lang="en-US" smtClean="0"/>
-              <a:t>4/16/2024</a:t>
+              <a:t>4/17/2024</a:t>
             </a:fld>
             <a:endParaRPr lang="en-US"/>
           </a:p>
@@ -4550,7 +4549,7 @@
           <a:p>
             <a:fld id="{B1FB3334-BD21-46B5-BD0F-B2FD4441121D}" type="datetimeFigureOut">
               <a:rPr lang="en-US" smtClean="0"/>
-              <a:t>4/16/2024</a:t>
+              <a:t>4/17/2024</a:t>
             </a:fld>
             <a:endParaRPr lang="en-US"/>
           </a:p>
@@ -5027,6 +5026,12 @@
             <a:r>
               <a:rPr lang="en-US" dirty="0"/>
               <a:t>A flexible way to write code and reproducible reports</a:t>
+            </a:r>
+          </a:p>
+          <a:p>
+            <a:r>
+              <a:rPr lang="en-US" dirty="0"/>
+              <a:t>Rosemary Hartman</a:t>
             </a:r>
           </a:p>
         </p:txBody>
@@ -6830,89 +6835,6 @@
           <p:cNvPr id="2" name="Title 1">
             <a:extLst>
               <a:ext uri="{FF2B5EF4-FFF2-40B4-BE49-F238E27FC236}">
-                <a16:creationId xmlns:a16="http://schemas.microsoft.com/office/drawing/2014/main" id="{713E49FD-8434-4AD2-4370-901D10AE6A1B}"/>
-              </a:ext>
-            </a:extLst>
-          </p:cNvPr>
-          <p:cNvSpPr>
-            <a:spLocks noGrp="1"/>
-          </p:cNvSpPr>
-          <p:nvPr>
-            <p:ph type="title"/>
-          </p:nvPr>
-        </p:nvSpPr>
-        <p:spPr/>
-        <p:txBody>
-          <a:bodyPr/>
-          <a:lstStyle/>
-          <a:p>
-            <a:r>
-              <a:rPr lang="en-US"/>
-              <a:t>Images</a:t>
-            </a:r>
-          </a:p>
-        </p:txBody>
-      </p:sp>
-      <p:sp>
-        <p:nvSpPr>
-          <p:cNvPr id="3" name="Content Placeholder 2">
-            <a:extLst>
-              <a:ext uri="{FF2B5EF4-FFF2-40B4-BE49-F238E27FC236}">
-                <a16:creationId xmlns:a16="http://schemas.microsoft.com/office/drawing/2014/main" id="{9A191E17-C68F-9311-B68B-516DE560B976}"/>
-              </a:ext>
-            </a:extLst>
-          </p:cNvPr>
-          <p:cNvSpPr>
-            <a:spLocks noGrp="1"/>
-          </p:cNvSpPr>
-          <p:nvPr>
-            <p:ph idx="1"/>
-          </p:nvPr>
-        </p:nvSpPr>
-        <p:spPr/>
-        <p:txBody>
-          <a:bodyPr/>
-          <a:lstStyle/>
-          <a:p>
-            <a:endParaRPr lang="en-US"/>
-          </a:p>
-        </p:txBody>
-      </p:sp>
-    </p:spTree>
-    <p:extLst>
-      <p:ext uri="{BB962C8B-B14F-4D97-AF65-F5344CB8AC3E}">
-        <p14:creationId xmlns:p14="http://schemas.microsoft.com/office/powerpoint/2010/main" val="1662011218"/>
-      </p:ext>
-    </p:extLst>
-  </p:cSld>
-  <p:clrMapOvr>
-    <a:masterClrMapping/>
-  </p:clrMapOvr>
-</p:sld>
-</file>
-
-<file path=ppt/slides/slide15.xml><?xml version="1.0" encoding="utf-8"?>
-<p:sld xmlns:a="http://schemas.openxmlformats.org/drawingml/2006/main" xmlns:r="http://schemas.openxmlformats.org/officeDocument/2006/relationships" xmlns:p="http://schemas.openxmlformats.org/presentationml/2006/main">
-  <p:cSld>
-    <p:spTree>
-      <p:nvGrpSpPr>
-        <p:cNvPr id="1" name=""/>
-        <p:cNvGrpSpPr/>
-        <p:nvPr/>
-      </p:nvGrpSpPr>
-      <p:grpSpPr>
-        <a:xfrm>
-          <a:off x="0" y="0"/>
-          <a:ext cx="0" cy="0"/>
-          <a:chOff x="0" y="0"/>
-          <a:chExt cx="0" cy="0"/>
-        </a:xfrm>
-      </p:grpSpPr>
-      <p:sp>
-        <p:nvSpPr>
-          <p:cNvPr id="2" name="Title 1">
-            <a:extLst>
-              <a:ext uri="{FF2B5EF4-FFF2-40B4-BE49-F238E27FC236}">
                 <a16:creationId xmlns:a16="http://schemas.microsoft.com/office/drawing/2014/main" id="{3DA53071-C2F2-A490-E0CE-548240157F45}"/>
               </a:ext>
             </a:extLst>
@@ -7159,6 +7081,97 @@
 </p:sld>
 </file>
 
+<file path=ppt/slides/slide15.xml><?xml version="1.0" encoding="utf-8"?>
+<p:sld xmlns:a="http://schemas.openxmlformats.org/drawingml/2006/main" xmlns:r="http://schemas.openxmlformats.org/officeDocument/2006/relationships" xmlns:p="http://schemas.openxmlformats.org/presentationml/2006/main">
+  <p:cSld>
+    <p:spTree>
+      <p:nvGrpSpPr>
+        <p:cNvPr id="1" name=""/>
+        <p:cNvGrpSpPr/>
+        <p:nvPr/>
+      </p:nvGrpSpPr>
+      <p:grpSpPr>
+        <a:xfrm>
+          <a:off x="0" y="0"/>
+          <a:ext cx="0" cy="0"/>
+          <a:chOff x="0" y="0"/>
+          <a:chExt cx="0" cy="0"/>
+        </a:xfrm>
+      </p:grpSpPr>
+      <p:sp>
+        <p:nvSpPr>
+          <p:cNvPr id="2" name="Title 1">
+            <a:extLst>
+              <a:ext uri="{FF2B5EF4-FFF2-40B4-BE49-F238E27FC236}">
+                <a16:creationId xmlns:a16="http://schemas.microsoft.com/office/drawing/2014/main" id="{BF280219-D336-3C4D-F90B-B332C5B63211}"/>
+              </a:ext>
+            </a:extLst>
+          </p:cNvPr>
+          <p:cNvSpPr>
+            <a:spLocks noGrp="1"/>
+          </p:cNvSpPr>
+          <p:nvPr>
+            <p:ph type="title"/>
+          </p:nvPr>
+        </p:nvSpPr>
+        <p:spPr/>
+        <p:txBody>
+          <a:bodyPr/>
+          <a:lstStyle/>
+          <a:p>
+            <a:r>
+              <a:rPr lang="en-US" dirty="0"/>
+              <a:t>Go To </a:t>
+            </a:r>
+            <a:r>
+              <a:rPr lang="en-US" dirty="0" err="1"/>
+              <a:t>Rstudio</a:t>
+            </a:r>
+            <a:endParaRPr lang="en-US" dirty="0"/>
+          </a:p>
+        </p:txBody>
+      </p:sp>
+      <p:sp>
+        <p:nvSpPr>
+          <p:cNvPr id="3" name="Content Placeholder 2">
+            <a:extLst>
+              <a:ext uri="{FF2B5EF4-FFF2-40B4-BE49-F238E27FC236}">
+                <a16:creationId xmlns:a16="http://schemas.microsoft.com/office/drawing/2014/main" id="{9646BE08-5489-EA65-0D76-D14B489548B2}"/>
+              </a:ext>
+            </a:extLst>
+          </p:cNvPr>
+          <p:cNvSpPr>
+            <a:spLocks noGrp="1"/>
+          </p:cNvSpPr>
+          <p:nvPr>
+            <p:ph idx="1"/>
+          </p:nvPr>
+        </p:nvSpPr>
+        <p:spPr/>
+        <p:txBody>
+          <a:bodyPr/>
+          <a:lstStyle/>
+          <a:p>
+            <a:r>
+              <a:rPr lang="en-US" dirty="0"/>
+              <a:t>Demo rendering</a:t>
+            </a:r>
+          </a:p>
+        </p:txBody>
+      </p:sp>
+    </p:spTree>
+    <p:extLst>
+      <p:ext uri="{BB962C8B-B14F-4D97-AF65-F5344CB8AC3E}">
+        <p14:creationId xmlns:p14="http://schemas.microsoft.com/office/powerpoint/2010/main" val="13970020"/>
+      </p:ext>
+    </p:extLst>
+  </p:cSld>
+  <p:clrMapOvr>
+    <a:masterClrMapping/>
+  </p:clrMapOvr>
+</p:sld>
+</file>
+
 <file path=ppt/slides/slide16.xml><?xml version="1.0" encoding="utf-8"?>
 <p:sld xmlns:a="http://schemas.openxmlformats.org/drawingml/2006/main" xmlns:r="http://schemas.openxmlformats.org/officeDocument/2006/relationships" xmlns:p="http://schemas.openxmlformats.org/presentationml/2006/main">
   <p:cSld>
@@ -7181,97 +7194,6 @@
           <p:cNvPr id="2" name="Title 1">
             <a:extLst>
               <a:ext uri="{FF2B5EF4-FFF2-40B4-BE49-F238E27FC236}">
-                <a16:creationId xmlns:a16="http://schemas.microsoft.com/office/drawing/2014/main" id="{BF280219-D336-3C4D-F90B-B332C5B63211}"/>
-              </a:ext>
-            </a:extLst>
-          </p:cNvPr>
-          <p:cNvSpPr>
-            <a:spLocks noGrp="1"/>
-          </p:cNvSpPr>
-          <p:nvPr>
-            <p:ph type="title"/>
-          </p:nvPr>
-        </p:nvSpPr>
-        <p:spPr/>
-        <p:txBody>
-          <a:bodyPr/>
-          <a:lstStyle/>
-          <a:p>
-            <a:r>
-              <a:rPr lang="en-US" dirty="0"/>
-              <a:t>Go To </a:t>
-            </a:r>
-            <a:r>
-              <a:rPr lang="en-US" dirty="0" err="1"/>
-              <a:t>Rstudio</a:t>
-            </a:r>
-            <a:endParaRPr lang="en-US" dirty="0"/>
-          </a:p>
-        </p:txBody>
-      </p:sp>
-      <p:sp>
-        <p:nvSpPr>
-          <p:cNvPr id="3" name="Content Placeholder 2">
-            <a:extLst>
-              <a:ext uri="{FF2B5EF4-FFF2-40B4-BE49-F238E27FC236}">
-                <a16:creationId xmlns:a16="http://schemas.microsoft.com/office/drawing/2014/main" id="{9646BE08-5489-EA65-0D76-D14B489548B2}"/>
-              </a:ext>
-            </a:extLst>
-          </p:cNvPr>
-          <p:cNvSpPr>
-            <a:spLocks noGrp="1"/>
-          </p:cNvSpPr>
-          <p:nvPr>
-            <p:ph idx="1"/>
-          </p:nvPr>
-        </p:nvSpPr>
-        <p:spPr/>
-        <p:txBody>
-          <a:bodyPr/>
-          <a:lstStyle/>
-          <a:p>
-            <a:r>
-              <a:rPr lang="en-US" dirty="0"/>
-              <a:t>Demo rendering</a:t>
-            </a:r>
-          </a:p>
-        </p:txBody>
-      </p:sp>
-    </p:spTree>
-    <p:extLst>
-      <p:ext uri="{BB962C8B-B14F-4D97-AF65-F5344CB8AC3E}">
-        <p14:creationId xmlns:p14="http://schemas.microsoft.com/office/powerpoint/2010/main" val="13970020"/>
-      </p:ext>
-    </p:extLst>
-  </p:cSld>
-  <p:clrMapOvr>
-    <a:masterClrMapping/>
-  </p:clrMapOvr>
-</p:sld>
-</file>
-
-<file path=ppt/slides/slide17.xml><?xml version="1.0" encoding="utf-8"?>
-<p:sld xmlns:a="http://schemas.openxmlformats.org/drawingml/2006/main" xmlns:r="http://schemas.openxmlformats.org/officeDocument/2006/relationships" xmlns:p="http://schemas.openxmlformats.org/presentationml/2006/main">
-  <p:cSld>
-    <p:spTree>
-      <p:nvGrpSpPr>
-        <p:cNvPr id="1" name=""/>
-        <p:cNvGrpSpPr/>
-        <p:nvPr/>
-      </p:nvGrpSpPr>
-      <p:grpSpPr>
-        <a:xfrm>
-          <a:off x="0" y="0"/>
-          <a:ext cx="0" cy="0"/>
-          <a:chOff x="0" y="0"/>
-          <a:chExt cx="0" cy="0"/>
-        </a:xfrm>
-      </p:grpSpPr>
-      <p:sp>
-        <p:nvSpPr>
-          <p:cNvPr id="2" name="Title 1">
-            <a:extLst>
-              <a:ext uri="{FF2B5EF4-FFF2-40B4-BE49-F238E27FC236}">
                 <a16:creationId xmlns:a16="http://schemas.microsoft.com/office/drawing/2014/main" id="{A7315BA7-B334-9106-F1EA-524FCF75163A}"/>
               </a:ext>
             </a:extLst>
@@ -7358,7 +7280,7 @@
 </p:sld>
 </file>
 
-<file path=ppt/slides/slide18.xml><?xml version="1.0" encoding="utf-8"?>
+<file path=ppt/slides/slide17.xml><?xml version="1.0" encoding="utf-8"?>
 <p:sld xmlns:a="http://schemas.openxmlformats.org/drawingml/2006/main" xmlns:r="http://schemas.openxmlformats.org/officeDocument/2006/relationships" xmlns:p="http://schemas.openxmlformats.org/presentationml/2006/main">
   <p:cSld>
     <p:spTree>

</xml_diff>

<commit_message>
Final tweaks to presentation (I swear)
</commit_message>
<xml_diff>
--- a/quartodemo/quartodemo.pptx
+++ b/quartodemo/quartodemo.pptx
@@ -134,7 +134,7 @@
 <file path=ppt/revisionInfo.xml><?xml version="1.0" encoding="utf-8"?>
 <p1510:revInfo xmlns:a="http://schemas.openxmlformats.org/drawingml/2006/main" xmlns:r="http://schemas.openxmlformats.org/officeDocument/2006/relationships" xmlns:p1510="http://schemas.microsoft.com/office/powerpoint/2015/10/main">
   <p1510:revLst>
-    <p1510:client id="{1E617022-5496-44DE-BF3A-27228D12BFB1}" v="18" dt="2024-04-16T18:06:38.560"/>
+    <p1510:client id="{1E617022-5496-44DE-BF3A-27228D12BFB1}" v="53" dt="2024-04-18T14:43:07.263"/>
   </p1510:revLst>
 </p1510:revInfo>
 </file>
@@ -144,12 +144,12 @@
   <pc:docChgLst>
     <pc:chgData name="Hartman, Rosemary@DWR" userId="984f44d5-4180-46ad-9b77-e367b17d9727" providerId="ADAL" clId="{1E617022-5496-44DE-BF3A-27228D12BFB1}"/>
     <pc:docChg chg="custSel addSld delSld modSld sldOrd">
-      <pc:chgData name="Hartman, Rosemary@DWR" userId="984f44d5-4180-46ad-9b77-e367b17d9727" providerId="ADAL" clId="{1E617022-5496-44DE-BF3A-27228D12BFB1}" dt="2024-04-18T03:46:48.303" v="1541" actId="47"/>
+      <pc:chgData name="Hartman, Rosemary@DWR" userId="984f44d5-4180-46ad-9b77-e367b17d9727" providerId="ADAL" clId="{1E617022-5496-44DE-BF3A-27228D12BFB1}" dt="2024-04-18T14:43:07.262" v="2002" actId="1076"/>
       <pc:docMkLst>
         <pc:docMk/>
       </pc:docMkLst>
       <pc:sldChg chg="modSp mod">
-        <pc:chgData name="Hartman, Rosemary@DWR" userId="984f44d5-4180-46ad-9b77-e367b17d9727" providerId="ADAL" clId="{1E617022-5496-44DE-BF3A-27228D12BFB1}" dt="2024-04-18T03:35:46.740" v="1540" actId="20577"/>
+        <pc:chgData name="Hartman, Rosemary@DWR" userId="984f44d5-4180-46ad-9b77-e367b17d9727" providerId="ADAL" clId="{1E617022-5496-44DE-BF3A-27228D12BFB1}" dt="2024-04-18T14:24:32.705" v="1565" actId="20577"/>
         <pc:sldMkLst>
           <pc:docMk/>
           <pc:sldMk cId="248703479" sldId="256"/>
@@ -163,13 +163,28 @@
           </ac:spMkLst>
         </pc:spChg>
         <pc:spChg chg="mod">
-          <ac:chgData name="Hartman, Rosemary@DWR" userId="984f44d5-4180-46ad-9b77-e367b17d9727" providerId="ADAL" clId="{1E617022-5496-44DE-BF3A-27228D12BFB1}" dt="2024-04-18T03:35:46.740" v="1540" actId="20577"/>
+          <ac:chgData name="Hartman, Rosemary@DWR" userId="984f44d5-4180-46ad-9b77-e367b17d9727" providerId="ADAL" clId="{1E617022-5496-44DE-BF3A-27228D12BFB1}" dt="2024-04-18T14:24:32.705" v="1565" actId="20577"/>
           <ac:spMkLst>
             <pc:docMk/>
             <pc:sldMk cId="248703479" sldId="256"/>
             <ac:spMk id="3" creationId="{7679B4A1-758E-D58E-DAAA-0EC93269E5FF}"/>
           </ac:spMkLst>
         </pc:spChg>
+      </pc:sldChg>
+      <pc:sldChg chg="addSp modSp mod modAnim">
+        <pc:chgData name="Hartman, Rosemary@DWR" userId="984f44d5-4180-46ad-9b77-e367b17d9727" providerId="ADAL" clId="{1E617022-5496-44DE-BF3A-27228D12BFB1}" dt="2024-04-18T14:25:29.520" v="1570"/>
+        <pc:sldMkLst>
+          <pc:docMk/>
+          <pc:sldMk cId="3724541275" sldId="257"/>
+        </pc:sldMkLst>
+        <pc:picChg chg="add mod">
+          <ac:chgData name="Hartman, Rosemary@DWR" userId="984f44d5-4180-46ad-9b77-e367b17d9727" providerId="ADAL" clId="{1E617022-5496-44DE-BF3A-27228D12BFB1}" dt="2024-04-18T14:25:26.944" v="1569" actId="1076"/>
+          <ac:picMkLst>
+            <pc:docMk/>
+            <pc:sldMk cId="3724541275" sldId="257"/>
+            <ac:picMk id="4" creationId="{710BDE93-CB9F-6306-1D2F-C9418A02ADEC}"/>
+          </ac:picMkLst>
+        </pc:picChg>
       </pc:sldChg>
       <pc:sldChg chg="del">
         <pc:chgData name="Hartman, Rosemary@DWR" userId="984f44d5-4180-46ad-9b77-e367b17d9727" providerId="ADAL" clId="{1E617022-5496-44DE-BF3A-27228D12BFB1}" dt="2024-04-15T20:28:15.788" v="1139" actId="47"/>
@@ -178,12 +193,27 @@
           <pc:sldMk cId="2436844360" sldId="258"/>
         </pc:sldMkLst>
       </pc:sldChg>
-      <pc:sldChg chg="addSp delSp modSp mod">
-        <pc:chgData name="Hartman, Rosemary@DWR" userId="984f44d5-4180-46ad-9b77-e367b17d9727" providerId="ADAL" clId="{1E617022-5496-44DE-BF3A-27228D12BFB1}" dt="2024-04-16T17:46:54.670" v="1188" actId="208"/>
+      <pc:sldChg chg="modNotesTx">
+        <pc:chgData name="Hartman, Rosemary@DWR" userId="984f44d5-4180-46ad-9b77-e367b17d9727" providerId="ADAL" clId="{1E617022-5496-44DE-BF3A-27228D12BFB1}" dt="2024-04-18T14:26:23.626" v="1717" actId="20577"/>
+        <pc:sldMkLst>
+          <pc:docMk/>
+          <pc:sldMk cId="3486628081" sldId="259"/>
+        </pc:sldMkLst>
+      </pc:sldChg>
+      <pc:sldChg chg="addSp delSp modSp mod modAnim">
+        <pc:chgData name="Hartman, Rosemary@DWR" userId="984f44d5-4180-46ad-9b77-e367b17d9727" providerId="ADAL" clId="{1E617022-5496-44DE-BF3A-27228D12BFB1}" dt="2024-04-18T14:27:39.281" v="1776" actId="1076"/>
         <pc:sldMkLst>
           <pc:docMk/>
           <pc:sldMk cId="528739318" sldId="260"/>
         </pc:sldMkLst>
+        <pc:spChg chg="add mod">
+          <ac:chgData name="Hartman, Rosemary@DWR" userId="984f44d5-4180-46ad-9b77-e367b17d9727" providerId="ADAL" clId="{1E617022-5496-44DE-BF3A-27228D12BFB1}" dt="2024-04-18T14:27:39.281" v="1776" actId="1076"/>
+          <ac:spMkLst>
+            <pc:docMk/>
+            <pc:sldMk cId="528739318" sldId="260"/>
+            <ac:spMk id="3" creationId="{08171129-227A-685F-2FD6-223B39727D11}"/>
+          </ac:spMkLst>
+        </pc:spChg>
         <pc:spChg chg="del">
           <ac:chgData name="Hartman, Rosemary@DWR" userId="984f44d5-4180-46ad-9b77-e367b17d9727" providerId="ADAL" clId="{1E617022-5496-44DE-BF3A-27228D12BFB1}" dt="2024-04-16T17:43:49.799" v="1169" actId="478"/>
           <ac:spMkLst>
@@ -328,12 +358,28 @@
           </ac:picMkLst>
         </pc:picChg>
       </pc:sldChg>
-      <pc:sldChg chg="addSp delSp modSp mod delAnim modNotesTx">
-        <pc:chgData name="Hartman, Rosemary@DWR" userId="984f44d5-4180-46ad-9b77-e367b17d9727" providerId="ADAL" clId="{1E617022-5496-44DE-BF3A-27228D12BFB1}" dt="2024-04-16T17:52:16.524" v="1372" actId="208"/>
+      <pc:sldChg chg="addSp delSp modSp mod delAnim modAnim modNotesTx">
+        <pc:chgData name="Hartman, Rosemary@DWR" userId="984f44d5-4180-46ad-9b77-e367b17d9727" providerId="ADAL" clId="{1E617022-5496-44DE-BF3A-27228D12BFB1}" dt="2024-04-18T14:37:41.589" v="1978"/>
         <pc:sldMkLst>
           <pc:docMk/>
           <pc:sldMk cId="1833180717" sldId="262"/>
         </pc:sldMkLst>
+        <pc:spChg chg="add mod">
+          <ac:chgData name="Hartman, Rosemary@DWR" userId="984f44d5-4180-46ad-9b77-e367b17d9727" providerId="ADAL" clId="{1E617022-5496-44DE-BF3A-27228D12BFB1}" dt="2024-04-18T14:37:12.296" v="1972" actId="1076"/>
+          <ac:spMkLst>
+            <pc:docMk/>
+            <pc:sldMk cId="1833180717" sldId="262"/>
+            <ac:spMk id="4" creationId="{172C8F02-2A74-ED1E-743D-689F2118135F}"/>
+          </ac:spMkLst>
+        </pc:spChg>
+        <pc:spChg chg="add mod">
+          <ac:chgData name="Hartman, Rosemary@DWR" userId="984f44d5-4180-46ad-9b77-e367b17d9727" providerId="ADAL" clId="{1E617022-5496-44DE-BF3A-27228D12BFB1}" dt="2024-04-18T14:37:16.226" v="1974" actId="1076"/>
+          <ac:spMkLst>
+            <pc:docMk/>
+            <pc:sldMk cId="1833180717" sldId="262"/>
+            <ac:spMk id="5" creationId="{21CEC41D-3224-D983-8516-F476E309972B}"/>
+          </ac:spMkLst>
+        </pc:spChg>
         <pc:picChg chg="del">
           <ac:chgData name="Hartman, Rosemary@DWR" userId="984f44d5-4180-46ad-9b77-e367b17d9727" providerId="ADAL" clId="{1E617022-5496-44DE-BF3A-27228D12BFB1}" dt="2024-04-16T17:51:19.527" v="1358" actId="478"/>
           <ac:picMkLst>
@@ -359,7 +405,7 @@
           </ac:picMkLst>
         </pc:picChg>
         <pc:picChg chg="add mod">
-          <ac:chgData name="Hartman, Rosemary@DWR" userId="984f44d5-4180-46ad-9b77-e367b17d9727" providerId="ADAL" clId="{1E617022-5496-44DE-BF3A-27228D12BFB1}" dt="2024-04-16T17:52:16.524" v="1372" actId="208"/>
+          <ac:chgData name="Hartman, Rosemary@DWR" userId="984f44d5-4180-46ad-9b77-e367b17d9727" providerId="ADAL" clId="{1E617022-5496-44DE-BF3A-27228D12BFB1}" dt="2024-04-18T14:37:08.776" v="1971" actId="1076"/>
           <ac:picMkLst>
             <pc:docMk/>
             <pc:sldMk cId="1833180717" sldId="262"/>
@@ -533,20 +579,52 @@
           </ac:picMkLst>
         </pc:picChg>
       </pc:sldChg>
-      <pc:sldChg chg="modSp mod">
-        <pc:chgData name="Hartman, Rosemary@DWR" userId="984f44d5-4180-46ad-9b77-e367b17d9727" providerId="ADAL" clId="{1E617022-5496-44DE-BF3A-27228D12BFB1}" dt="2024-04-15T19:44:36.560" v="98" actId="20577"/>
+      <pc:sldChg chg="addSp modSp mod modNotesTx">
+        <pc:chgData name="Hartman, Rosemary@DWR" userId="984f44d5-4180-46ad-9b77-e367b17d9727" providerId="ADAL" clId="{1E617022-5496-44DE-BF3A-27228D12BFB1}" dt="2024-04-18T14:36:44.417" v="1968" actId="20577"/>
         <pc:sldMkLst>
           <pc:docMk/>
           <pc:sldMk cId="3722293906" sldId="265"/>
         </pc:sldMkLst>
+        <pc:spChg chg="add mod">
+          <ac:chgData name="Hartman, Rosemary@DWR" userId="984f44d5-4180-46ad-9b77-e367b17d9727" providerId="ADAL" clId="{1E617022-5496-44DE-BF3A-27228D12BFB1}" dt="2024-04-18T14:36:38.031" v="1963" actId="1076"/>
+          <ac:spMkLst>
+            <pc:docMk/>
+            <pc:sldMk cId="3722293906" sldId="265"/>
+            <ac:spMk id="3" creationId="{DE0E9304-ED1C-1AA2-200B-B0F33515D444}"/>
+          </ac:spMkLst>
+        </pc:spChg>
+        <pc:spChg chg="add mod">
+          <ac:chgData name="Hartman, Rosemary@DWR" userId="984f44d5-4180-46ad-9b77-e367b17d9727" providerId="ADAL" clId="{1E617022-5496-44DE-BF3A-27228D12BFB1}" dt="2024-04-18T14:36:44.417" v="1968" actId="20577"/>
+          <ac:spMkLst>
+            <pc:docMk/>
+            <pc:sldMk cId="3722293906" sldId="265"/>
+            <ac:spMk id="4" creationId="{00FA55EC-7856-36AE-225B-84CAAB44749B}"/>
+          </ac:spMkLst>
+        </pc:spChg>
         <pc:spChg chg="mod">
-          <ac:chgData name="Hartman, Rosemary@DWR" userId="984f44d5-4180-46ad-9b77-e367b17d9727" providerId="ADAL" clId="{1E617022-5496-44DE-BF3A-27228D12BFB1}" dt="2024-04-15T19:44:36.560" v="98" actId="20577"/>
+          <ac:chgData name="Hartman, Rosemary@DWR" userId="984f44d5-4180-46ad-9b77-e367b17d9727" providerId="ADAL" clId="{1E617022-5496-44DE-BF3A-27228D12BFB1}" dt="2024-04-18T14:29:54.673" v="1934" actId="14100"/>
           <ac:spMkLst>
             <pc:docMk/>
             <pc:sldMk cId="3722293906" sldId="265"/>
             <ac:spMk id="7" creationId="{A226FCBF-7553-F175-A259-3B7E93D28265}"/>
           </ac:spMkLst>
         </pc:spChg>
+        <pc:picChg chg="add mod">
+          <ac:chgData name="Hartman, Rosemary@DWR" userId="984f44d5-4180-46ad-9b77-e367b17d9727" providerId="ADAL" clId="{1E617022-5496-44DE-BF3A-27228D12BFB1}" dt="2024-04-18T14:36:19.104" v="1948" actId="1076"/>
+          <ac:picMkLst>
+            <pc:docMk/>
+            <pc:sldMk cId="3722293906" sldId="265"/>
+            <ac:picMk id="1026" creationId="{8678177D-6E79-8B90-9AAF-3C4921C500DC}"/>
+          </ac:picMkLst>
+        </pc:picChg>
+        <pc:picChg chg="add mod">
+          <ac:chgData name="Hartman, Rosemary@DWR" userId="984f44d5-4180-46ad-9b77-e367b17d9727" providerId="ADAL" clId="{1E617022-5496-44DE-BF3A-27228D12BFB1}" dt="2024-04-18T14:36:10.200" v="1945" actId="1076"/>
+          <ac:picMkLst>
+            <pc:docMk/>
+            <pc:sldMk cId="3722293906" sldId="265"/>
+            <ac:picMk id="1028" creationId="{5FC04EBA-DBD3-60B5-1594-62EA1CB9B7E7}"/>
+          </ac:picMkLst>
+        </pc:picChg>
       </pc:sldChg>
       <pc:sldChg chg="mod modShow modNotesTx">
         <pc:chgData name="Hartman, Rosemary@DWR" userId="984f44d5-4180-46ad-9b77-e367b17d9727" providerId="ADAL" clId="{1E617022-5496-44DE-BF3A-27228D12BFB1}" dt="2024-04-15T20:28:30.965" v="1140" actId="729"/>
@@ -556,13 +634,13 @@
         </pc:sldMkLst>
       </pc:sldChg>
       <pc:sldChg chg="addSp delSp modSp mod modAnim">
-        <pc:chgData name="Hartman, Rosemary@DWR" userId="984f44d5-4180-46ad-9b77-e367b17d9727" providerId="ADAL" clId="{1E617022-5496-44DE-BF3A-27228D12BFB1}" dt="2024-04-16T18:06:04.803" v="1501" actId="20577"/>
+        <pc:chgData name="Hartman, Rosemary@DWR" userId="984f44d5-4180-46ad-9b77-e367b17d9727" providerId="ADAL" clId="{1E617022-5496-44DE-BF3A-27228D12BFB1}" dt="2024-04-18T14:41:58.558" v="2000" actId="20577"/>
         <pc:sldMkLst>
           <pc:docMk/>
           <pc:sldMk cId="2466529824" sldId="267"/>
         </pc:sldMkLst>
         <pc:spChg chg="mod">
-          <ac:chgData name="Hartman, Rosemary@DWR" userId="984f44d5-4180-46ad-9b77-e367b17d9727" providerId="ADAL" clId="{1E617022-5496-44DE-BF3A-27228D12BFB1}" dt="2024-04-16T17:57:56.562" v="1410" actId="20577"/>
+          <ac:chgData name="Hartman, Rosemary@DWR" userId="984f44d5-4180-46ad-9b77-e367b17d9727" providerId="ADAL" clId="{1E617022-5496-44DE-BF3A-27228D12BFB1}" dt="2024-04-18T14:41:58.558" v="2000" actId="20577"/>
           <ac:spMkLst>
             <pc:docMk/>
             <pc:sldMk cId="2466529824" sldId="267"/>
@@ -601,6 +679,22 @@
             <ac:picMk id="6" creationId="{338C9095-B02D-88E5-0AEE-27831EEA940D}"/>
           </ac:picMkLst>
         </pc:picChg>
+        <pc:picChg chg="add del">
+          <ac:chgData name="Hartman, Rosemary@DWR" userId="984f44d5-4180-46ad-9b77-e367b17d9727" providerId="ADAL" clId="{1E617022-5496-44DE-BF3A-27228D12BFB1}" dt="2024-04-18T14:41:04.329" v="1980" actId="478"/>
+          <ac:picMkLst>
+            <pc:docMk/>
+            <pc:sldMk cId="2466529824" sldId="267"/>
+            <ac:picMk id="2050" creationId="{B519E8DA-720B-E5EB-360D-E37BA164C348}"/>
+          </ac:picMkLst>
+        </pc:picChg>
+        <pc:picChg chg="add mod">
+          <ac:chgData name="Hartman, Rosemary@DWR" userId="984f44d5-4180-46ad-9b77-e367b17d9727" providerId="ADAL" clId="{1E617022-5496-44DE-BF3A-27228D12BFB1}" dt="2024-04-18T14:41:35.758" v="1983" actId="1076"/>
+          <ac:picMkLst>
+            <pc:docMk/>
+            <pc:sldMk cId="2466529824" sldId="267"/>
+            <ac:picMk id="2052" creationId="{64DD3B39-67AA-60DD-9902-7852372DA846}"/>
+          </ac:picMkLst>
+        </pc:picChg>
       </pc:sldChg>
       <pc:sldChg chg="modSp mod">
         <pc:chgData name="Hartman, Rosemary@DWR" userId="984f44d5-4180-46ad-9b77-e367b17d9727" providerId="ADAL" clId="{1E617022-5496-44DE-BF3A-27228D12BFB1}" dt="2024-04-16T18:06:09.667" v="1512" actId="20577"/>
@@ -632,8 +726,8 @@
           </ac:picMkLst>
         </pc:picChg>
       </pc:sldChg>
-      <pc:sldChg chg="modSp new mod">
-        <pc:chgData name="Hartman, Rosemary@DWR" userId="984f44d5-4180-46ad-9b77-e367b17d9727" providerId="ADAL" clId="{1E617022-5496-44DE-BF3A-27228D12BFB1}" dt="2024-04-16T18:06:38.575" v="1516" actId="20577"/>
+      <pc:sldChg chg="addSp modSp new mod">
+        <pc:chgData name="Hartman, Rosemary@DWR" userId="984f44d5-4180-46ad-9b77-e367b17d9727" providerId="ADAL" clId="{1E617022-5496-44DE-BF3A-27228D12BFB1}" dt="2024-04-18T14:43:07.262" v="2002" actId="1076"/>
         <pc:sldMkLst>
           <pc:docMk/>
           <pc:sldMk cId="1079971890" sldId="271"/>
@@ -654,6 +748,14 @@
             <ac:spMk id="3" creationId="{16BDA4C4-20BA-6B08-FA15-D6AE468D774B}"/>
           </ac:spMkLst>
         </pc:spChg>
+        <pc:picChg chg="add mod">
+          <ac:chgData name="Hartman, Rosemary@DWR" userId="984f44d5-4180-46ad-9b77-e367b17d9727" providerId="ADAL" clId="{1E617022-5496-44DE-BF3A-27228D12BFB1}" dt="2024-04-18T14:43:07.262" v="2002" actId="1076"/>
+          <ac:picMkLst>
+            <pc:docMk/>
+            <pc:sldMk cId="1079971890" sldId="271"/>
+            <ac:picMk id="3074" creationId="{79F4FF16-76A6-A023-6096-A89EAA1EE673}"/>
+          </ac:picMkLst>
+        </pc:picChg>
       </pc:sldChg>
       <pc:sldChg chg="modSp add del mod ord">
         <pc:chgData name="Hartman, Rosemary@DWR" userId="984f44d5-4180-46ad-9b77-e367b17d9727" providerId="ADAL" clId="{1E617022-5496-44DE-BF3A-27228D12BFB1}" dt="2024-04-15T19:56:55.384" v="979" actId="47"/>
@@ -685,8 +787,8 @@
           </ac:spMkLst>
         </pc:spChg>
       </pc:sldChg>
-      <pc:sldChg chg="addSp delSp modSp new mod modClrScheme chgLayout">
-        <pc:chgData name="Hartman, Rosemary@DWR" userId="984f44d5-4180-46ad-9b77-e367b17d9727" providerId="ADAL" clId="{1E617022-5496-44DE-BF3A-27228D12BFB1}" dt="2024-04-16T17:49:00.616" v="1357" actId="20577"/>
+      <pc:sldChg chg="addSp delSp modSp new mod modClrScheme modAnim chgLayout">
+        <pc:chgData name="Hartman, Rosemary@DWR" userId="984f44d5-4180-46ad-9b77-e367b17d9727" providerId="ADAL" clId="{1E617022-5496-44DE-BF3A-27228D12BFB1}" dt="2024-04-18T14:31:29.009" v="1939"/>
         <pc:sldMkLst>
           <pc:docMk/>
           <pc:sldMk cId="95428500" sldId="273"/>
@@ -697,6 +799,14 @@
             <pc:docMk/>
             <pc:sldMk cId="95428500" sldId="273"/>
             <ac:spMk id="2" creationId="{F632D0AA-BD3B-4BF9-4DEC-0823693D8F44}"/>
+          </ac:spMkLst>
+        </pc:spChg>
+        <pc:spChg chg="add mod">
+          <ac:chgData name="Hartman, Rosemary@DWR" userId="984f44d5-4180-46ad-9b77-e367b17d9727" providerId="ADAL" clId="{1E617022-5496-44DE-BF3A-27228D12BFB1}" dt="2024-04-18T14:27:04.120" v="1771" actId="404"/>
+          <ac:spMkLst>
+            <pc:docMk/>
+            <pc:sldMk cId="95428500" sldId="273"/>
+            <ac:spMk id="3" creationId="{35C27704-B8A1-C170-65D2-1CEB000E0563}"/>
           </ac:spMkLst>
         </pc:spChg>
         <pc:spChg chg="del mod ord">
@@ -739,6 +849,14 @@
             <ac:spMk id="7" creationId="{CFE0933C-C3EE-C807-C8A7-41CC50275115}"/>
           </ac:spMkLst>
         </pc:spChg>
+        <pc:picChg chg="add mod">
+          <ac:chgData name="Hartman, Rosemary@DWR" userId="984f44d5-4180-46ad-9b77-e367b17d9727" providerId="ADAL" clId="{1E617022-5496-44DE-BF3A-27228D12BFB1}" dt="2024-04-18T14:31:19.562" v="1937" actId="1076"/>
+          <ac:picMkLst>
+            <pc:docMk/>
+            <pc:sldMk cId="95428500" sldId="273"/>
+            <ac:picMk id="8" creationId="{8634AFBD-9A31-FDCA-4EA2-535BE53F8944}"/>
+          </ac:picMkLst>
+        </pc:picChg>
       </pc:sldChg>
       <pc:sldChg chg="modSp new del mod">
         <pc:chgData name="Hartman, Rosemary@DWR" userId="984f44d5-4180-46ad-9b77-e367b17d9727" providerId="ADAL" clId="{1E617022-5496-44DE-BF3A-27228D12BFB1}" dt="2024-04-18T03:46:48.303" v="1541" actId="47"/>
@@ -842,7 +960,7 @@
           <a:p>
             <a:fld id="{27661C8C-4142-4BB9-A91E-1A3F9011B33B}" type="datetimeFigureOut">
               <a:rPr lang="en-US" smtClean="0"/>
-              <a:t>4/17/2024</a:t>
+              <a:t>4/18/2024</a:t>
             </a:fld>
             <a:endParaRPr lang="en-US"/>
           </a:p>
@@ -1266,7 +1384,13 @@
             </a:r>
             <a:r>
               <a:rPr lang="en-US" dirty="0"/>
-              <a:t>. That is what R Markdown is for.</a:t>
+              <a:t>. That is what quarto is for.</a:t>
+            </a:r>
+          </a:p>
+          <a:p>
+            <a:r>
+              <a:rPr lang="en-US" dirty="0"/>
+              <a:t>This is an example of a remote I made that updates automatically every day! Pretty basic, but there are a lot of more advanced options.</a:t>
             </a:r>
           </a:p>
         </p:txBody>
@@ -1532,7 +1656,31 @@
           <a:p>
             <a:r>
               <a:rPr lang="en-US" dirty="0"/>
-              <a:t>Rather than trying to remember all that markdown syntax yourself, you can also edit your document in ‘visual’ mode, which lets you edit it the same way you would a word document. You can switch back and forth at any time.</a:t>
+              <a:t>Your markdown chunks are formatted using </a:t>
+            </a:r>
+            <a:r>
+              <a:rPr lang="en-US" dirty="0" err="1"/>
+              <a:t>pandoc</a:t>
+            </a:r>
+            <a:r>
+              <a:rPr lang="en-US" dirty="0"/>
+              <a:t> markdown, though you can also include html (if you’re </a:t>
+            </a:r>
+            <a:r>
+              <a:rPr lang="en-US" dirty="0" err="1"/>
+              <a:t>usin</a:t>
+            </a:r>
+            <a:r>
+              <a:rPr lang="en-US" dirty="0"/>
+              <a:t> </a:t>
+            </a:r>
+            <a:r>
+              <a:rPr lang="en-US" dirty="0" err="1"/>
+              <a:t>gHTML</a:t>
+            </a:r>
+            <a:r>
+              <a:rPr lang="en-US" dirty="0"/>
+              <a:t> for the final report)</a:t>
             </a:r>
           </a:p>
         </p:txBody>
@@ -1554,7 +1702,7 @@
           <a:p>
             <a:fld id="{9AAC6531-FD8D-41B0-A5CF-A73B3FFD4F1A}" type="slidenum">
               <a:rPr lang="en-US" smtClean="0"/>
-              <a:t>9</a:t>
+              <a:t>7</a:t>
             </a:fld>
             <a:endParaRPr lang="en-US"/>
           </a:p>
@@ -1563,7 +1711,7 @@
     </p:spTree>
     <p:extLst>
       <p:ext uri="{BB962C8B-B14F-4D97-AF65-F5344CB8AC3E}">
-        <p14:creationId xmlns:p14="http://schemas.microsoft.com/office/powerpoint/2010/main" val="2487256762"/>
+        <p14:creationId xmlns:p14="http://schemas.microsoft.com/office/powerpoint/2010/main" val="343145482"/>
       </p:ext>
     </p:extLst>
   </p:cSld>
@@ -1619,6 +1767,93 @@
           <a:p>
             <a:r>
               <a:rPr lang="en-US" dirty="0"/>
+              <a:t>Rather than trying to remember all that markdown syntax yourself, you can also edit your document in ‘visual’ mode, which lets you edit it the same way you would a word document. You can switch back and forth at any time.</a:t>
+            </a:r>
+          </a:p>
+        </p:txBody>
+      </p:sp>
+      <p:sp>
+        <p:nvSpPr>
+          <p:cNvPr id="4" name="Slide Number Placeholder 3"/>
+          <p:cNvSpPr>
+            <a:spLocks noGrp="1"/>
+          </p:cNvSpPr>
+          <p:nvPr>
+            <p:ph type="sldNum" sz="quarter" idx="5"/>
+          </p:nvPr>
+        </p:nvSpPr>
+        <p:spPr/>
+        <p:txBody>
+          <a:bodyPr/>
+          <a:lstStyle/>
+          <a:p>
+            <a:fld id="{9AAC6531-FD8D-41B0-A5CF-A73B3FFD4F1A}" type="slidenum">
+              <a:rPr lang="en-US" smtClean="0"/>
+              <a:t>9</a:t>
+            </a:fld>
+            <a:endParaRPr lang="en-US"/>
+          </a:p>
+        </p:txBody>
+      </p:sp>
+    </p:spTree>
+    <p:extLst>
+      <p:ext uri="{BB962C8B-B14F-4D97-AF65-F5344CB8AC3E}">
+        <p14:creationId xmlns:p14="http://schemas.microsoft.com/office/powerpoint/2010/main" val="2487256762"/>
+      </p:ext>
+    </p:extLst>
+  </p:cSld>
+  <p:clrMapOvr>
+    <a:masterClrMapping/>
+  </p:clrMapOvr>
+</p:notes>
+</file>
+
+<file path=ppt/notesSlides/notesSlide7.xml><?xml version="1.0" encoding="utf-8"?>
+<p:notes xmlns:a="http://schemas.openxmlformats.org/drawingml/2006/main" xmlns:r="http://schemas.openxmlformats.org/officeDocument/2006/relationships" xmlns:p="http://schemas.openxmlformats.org/presentationml/2006/main">
+  <p:cSld>
+    <p:spTree>
+      <p:nvGrpSpPr>
+        <p:cNvPr id="1" name=""/>
+        <p:cNvGrpSpPr/>
+        <p:nvPr/>
+      </p:nvGrpSpPr>
+      <p:grpSpPr>
+        <a:xfrm>
+          <a:off x="0" y="0"/>
+          <a:ext cx="0" cy="0"/>
+          <a:chOff x="0" y="0"/>
+          <a:chExt cx="0" cy="0"/>
+        </a:xfrm>
+      </p:grpSpPr>
+      <p:sp>
+        <p:nvSpPr>
+          <p:cNvPr id="2" name="Slide Image Placeholder 1"/>
+          <p:cNvSpPr>
+            <a:spLocks noGrp="1" noRot="1" noChangeAspect="1"/>
+          </p:cNvSpPr>
+          <p:nvPr>
+            <p:ph type="sldImg"/>
+          </p:nvPr>
+        </p:nvSpPr>
+        <p:spPr/>
+      </p:sp>
+      <p:sp>
+        <p:nvSpPr>
+          <p:cNvPr id="3" name="Notes Placeholder 2"/>
+          <p:cNvSpPr>
+            <a:spLocks noGrp="1"/>
+          </p:cNvSpPr>
+          <p:nvPr>
+            <p:ph type="body" idx="1"/>
+          </p:nvPr>
+        </p:nvSpPr>
+        <p:spPr/>
+        <p:txBody>
+          <a:bodyPr/>
+          <a:lstStyle/>
+          <a:p>
+            <a:r>
+              <a:rPr lang="en-US" dirty="0"/>
               <a:t>You can set other options in the global options menu or the project options menu. In particular, note the ‘show output preview’ </a:t>
             </a:r>
             <a:r>
@@ -1668,7 +1903,7 @@
 </p:notes>
 </file>
 
-<file path=ppt/notesSlides/notesSlide7.xml><?xml version="1.0" encoding="utf-8"?>
+<file path=ppt/notesSlides/notesSlide8.xml><?xml version="1.0" encoding="utf-8"?>
 <p:notes xmlns:a="http://schemas.openxmlformats.org/drawingml/2006/main" xmlns:r="http://schemas.openxmlformats.org/officeDocument/2006/relationships" xmlns:p="http://schemas.openxmlformats.org/presentationml/2006/main">
   <p:cSld>
     <p:spTree>
@@ -1899,7 +2134,7 @@
           <a:p>
             <a:fld id="{B1FB3334-BD21-46B5-BD0F-B2FD4441121D}" type="datetimeFigureOut">
               <a:rPr lang="en-US" smtClean="0"/>
-              <a:t>4/17/2024</a:t>
+              <a:t>4/18/2024</a:t>
             </a:fld>
             <a:endParaRPr lang="en-US"/>
           </a:p>
@@ -2097,7 +2332,7 @@
           <a:p>
             <a:fld id="{B1FB3334-BD21-46B5-BD0F-B2FD4441121D}" type="datetimeFigureOut">
               <a:rPr lang="en-US" smtClean="0"/>
-              <a:t>4/17/2024</a:t>
+              <a:t>4/18/2024</a:t>
             </a:fld>
             <a:endParaRPr lang="en-US"/>
           </a:p>
@@ -2305,7 +2540,7 @@
           <a:p>
             <a:fld id="{B1FB3334-BD21-46B5-BD0F-B2FD4441121D}" type="datetimeFigureOut">
               <a:rPr lang="en-US" smtClean="0"/>
-              <a:t>4/17/2024</a:t>
+              <a:t>4/18/2024</a:t>
             </a:fld>
             <a:endParaRPr lang="en-US"/>
           </a:p>
@@ -2503,7 +2738,7 @@
           <a:p>
             <a:fld id="{B1FB3334-BD21-46B5-BD0F-B2FD4441121D}" type="datetimeFigureOut">
               <a:rPr lang="en-US" smtClean="0"/>
-              <a:t>4/17/2024</a:t>
+              <a:t>4/18/2024</a:t>
             </a:fld>
             <a:endParaRPr lang="en-US"/>
           </a:p>
@@ -2778,7 +3013,7 @@
           <a:p>
             <a:fld id="{B1FB3334-BD21-46B5-BD0F-B2FD4441121D}" type="datetimeFigureOut">
               <a:rPr lang="en-US" smtClean="0"/>
-              <a:t>4/17/2024</a:t>
+              <a:t>4/18/2024</a:t>
             </a:fld>
             <a:endParaRPr lang="en-US"/>
           </a:p>
@@ -3043,7 +3278,7 @@
           <a:p>
             <a:fld id="{B1FB3334-BD21-46B5-BD0F-B2FD4441121D}" type="datetimeFigureOut">
               <a:rPr lang="en-US" smtClean="0"/>
-              <a:t>4/17/2024</a:t>
+              <a:t>4/18/2024</a:t>
             </a:fld>
             <a:endParaRPr lang="en-US"/>
           </a:p>
@@ -3455,7 +3690,7 @@
           <a:p>
             <a:fld id="{B1FB3334-BD21-46B5-BD0F-B2FD4441121D}" type="datetimeFigureOut">
               <a:rPr lang="en-US" smtClean="0"/>
-              <a:t>4/17/2024</a:t>
+              <a:t>4/18/2024</a:t>
             </a:fld>
             <a:endParaRPr lang="en-US"/>
           </a:p>
@@ -3596,7 +3831,7 @@
           <a:p>
             <a:fld id="{B1FB3334-BD21-46B5-BD0F-B2FD4441121D}" type="datetimeFigureOut">
               <a:rPr lang="en-US" smtClean="0"/>
-              <a:t>4/17/2024</a:t>
+              <a:t>4/18/2024</a:t>
             </a:fld>
             <a:endParaRPr lang="en-US"/>
           </a:p>
@@ -3709,7 +3944,7 @@
           <a:p>
             <a:fld id="{B1FB3334-BD21-46B5-BD0F-B2FD4441121D}" type="datetimeFigureOut">
               <a:rPr lang="en-US" smtClean="0"/>
-              <a:t>4/17/2024</a:t>
+              <a:t>4/18/2024</a:t>
             </a:fld>
             <a:endParaRPr lang="en-US"/>
           </a:p>
@@ -4020,7 +4255,7 @@
           <a:p>
             <a:fld id="{B1FB3334-BD21-46B5-BD0F-B2FD4441121D}" type="datetimeFigureOut">
               <a:rPr lang="en-US" smtClean="0"/>
-              <a:t>4/17/2024</a:t>
+              <a:t>4/18/2024</a:t>
             </a:fld>
             <a:endParaRPr lang="en-US"/>
           </a:p>
@@ -4308,7 +4543,7 @@
           <a:p>
             <a:fld id="{B1FB3334-BD21-46B5-BD0F-B2FD4441121D}" type="datetimeFigureOut">
               <a:rPr lang="en-US" smtClean="0"/>
-              <a:t>4/17/2024</a:t>
+              <a:t>4/18/2024</a:t>
             </a:fld>
             <a:endParaRPr lang="en-US"/>
           </a:p>
@@ -4549,7 +4784,7 @@
           <a:p>
             <a:fld id="{B1FB3334-BD21-46B5-BD0F-B2FD4441121D}" type="datetimeFigureOut">
               <a:rPr lang="en-US" smtClean="0"/>
-              <a:t>4/17/2024</a:t>
+              <a:t>4/18/2024</a:t>
             </a:fld>
             <a:endParaRPr lang="en-US"/>
           </a:p>
@@ -5032,6 +5267,12 @@
             <a:r>
               <a:rPr lang="en-US" dirty="0"/>
               <a:t>Rosemary Hartman</a:t>
+            </a:r>
+          </a:p>
+          <a:p>
+            <a:r>
+              <a:rPr lang="en-US" dirty="0"/>
+              <a:t>2024-4-18</a:t>
             </a:r>
           </a:p>
         </p:txBody>
@@ -6853,7 +7094,7 @@
           <a:p>
             <a:r>
               <a:rPr lang="en-US" dirty="0"/>
-              <a:t>Rendering</a:t>
+              <a:t>Rendering (knitting)</a:t>
             </a:r>
           </a:p>
         </p:txBody>
@@ -6987,6 +7228,53 @@
           </a:p>
         </p:txBody>
       </p:sp>
+      <p:pic>
+        <p:nvPicPr>
+          <p:cNvPr id="2052" name="Picture 4" descr="Lolcats - knit - LOL at Funny Cat Memes - Funny cat pictures with words on  them - lol | cat memes | funny cats | funny cat pictures with words on">
+            <a:extLst>
+              <a:ext uri="{FF2B5EF4-FFF2-40B4-BE49-F238E27FC236}">
+                <a16:creationId xmlns:a16="http://schemas.microsoft.com/office/drawing/2014/main" id="{64DD3B39-67AA-60DD-9902-7852372DA846}"/>
+              </a:ext>
+            </a:extLst>
+          </p:cNvPr>
+          <p:cNvPicPr>
+            <a:picLocks noChangeAspect="1" noChangeArrowheads="1"/>
+          </p:cNvPicPr>
+          <p:nvPr/>
+        </p:nvPicPr>
+        <p:blipFill>
+          <a:blip r:embed="rId3">
+            <a:extLst>
+              <a:ext uri="{28A0092B-C50C-407E-A947-70E740481C1C}">
+                <a14:useLocalDpi xmlns:a14="http://schemas.microsoft.com/office/drawing/2010/main" val="0"/>
+              </a:ext>
+            </a:extLst>
+          </a:blip>
+          <a:srcRect/>
+          <a:stretch>
+            <a:fillRect/>
+          </a:stretch>
+        </p:blipFill>
+        <p:spPr bwMode="auto">
+          <a:xfrm>
+            <a:off x="7286080" y="4001294"/>
+            <a:ext cx="2668633" cy="2668633"/>
+          </a:xfrm>
+          <a:prstGeom prst="rect">
+            <a:avLst/>
+          </a:prstGeom>
+          <a:noFill/>
+          <a:extLst>
+            <a:ext uri="{909E8E84-426E-40DD-AFC4-6F175D3DCCD1}">
+              <a14:hiddenFill xmlns:a14="http://schemas.microsoft.com/office/drawing/2010/main">
+                <a:solidFill>
+                  <a:srgbClr val="FFFFFF"/>
+                </a:solidFill>
+              </a14:hiddenFill>
+            </a:ext>
+          </a:extLst>
+        </p:spPr>
+      </p:pic>
     </p:spTree>
     <p:extLst>
       <p:ext uri="{BB962C8B-B14F-4D97-AF65-F5344CB8AC3E}">
@@ -7254,19 +7542,65 @@
           </a:p>
           <a:p>
             <a:r>
-              <a:rPr lang="en-US">
+              <a:rPr lang="en-US" dirty="0">
                 <a:hlinkClick r:id="rId3"/>
               </a:rPr>
               <a:t>https://quarto.org/docs/gallery/</a:t>
             </a:r>
             <a:r>
-              <a:rPr lang="en-US"/>
+              <a:rPr lang="en-US" dirty="0"/>
               <a:t>  </a:t>
             </a:r>
-            <a:endParaRPr lang="en-US" dirty="0"/>
-          </a:p>
-        </p:txBody>
-      </p:sp>
+          </a:p>
+        </p:txBody>
+      </p:sp>
+      <p:pic>
+        <p:nvPicPr>
+          <p:cNvPr id="3074" name="Picture 2" descr="The sky's the limit!&quot; - Lolcats - lol | cat memes | funny cats | funny cat  pictures with words on them | funny pictures | lol cat memes | lol cats">
+            <a:extLst>
+              <a:ext uri="{FF2B5EF4-FFF2-40B4-BE49-F238E27FC236}">
+                <a16:creationId xmlns:a16="http://schemas.microsoft.com/office/drawing/2014/main" id="{79F4FF16-76A6-A023-6096-A89EAA1EE673}"/>
+              </a:ext>
+            </a:extLst>
+          </p:cNvPr>
+          <p:cNvPicPr>
+            <a:picLocks noChangeAspect="1" noChangeArrowheads="1"/>
+          </p:cNvPicPr>
+          <p:nvPr/>
+        </p:nvPicPr>
+        <p:blipFill>
+          <a:blip r:embed="rId4">
+            <a:extLst>
+              <a:ext uri="{28A0092B-C50C-407E-A947-70E740481C1C}">
+                <a14:useLocalDpi xmlns:a14="http://schemas.microsoft.com/office/drawing/2010/main" val="0"/>
+              </a:ext>
+            </a:extLst>
+          </a:blip>
+          <a:srcRect/>
+          <a:stretch>
+            <a:fillRect/>
+          </a:stretch>
+        </p:blipFill>
+        <p:spPr bwMode="auto">
+          <a:xfrm>
+            <a:off x="6781800" y="1825625"/>
+            <a:ext cx="4572000" cy="3429000"/>
+          </a:xfrm>
+          <a:prstGeom prst="rect">
+            <a:avLst/>
+          </a:prstGeom>
+          <a:noFill/>
+          <a:extLst>
+            <a:ext uri="{909E8E84-426E-40DD-AFC4-6F175D3DCCD1}">
+              <a14:hiddenFill xmlns:a14="http://schemas.microsoft.com/office/drawing/2010/main">
+                <a:solidFill>
+                  <a:srgbClr val="FFFFFF"/>
+                </a:solidFill>
+              </a14:hiddenFill>
+            </a:ext>
+          </a:extLst>
+        </p:spPr>
+      </p:pic>
     </p:spTree>
     <p:extLst>
       <p:ext uri="{BB962C8B-B14F-4D97-AF65-F5344CB8AC3E}">
@@ -7463,6 +7797,36 @@
           </a:prstGeom>
         </p:spPr>
       </p:pic>
+      <p:pic>
+        <p:nvPicPr>
+          <p:cNvPr id="4" name="Picture 3">
+            <a:extLst>
+              <a:ext uri="{FF2B5EF4-FFF2-40B4-BE49-F238E27FC236}">
+                <a16:creationId xmlns:a16="http://schemas.microsoft.com/office/drawing/2014/main" id="{710BDE93-CB9F-6306-1D2F-C9418A02ADEC}"/>
+              </a:ext>
+            </a:extLst>
+          </p:cNvPr>
+          <p:cNvPicPr>
+            <a:picLocks noChangeAspect="1"/>
+          </p:cNvPicPr>
+          <p:nvPr/>
+        </p:nvPicPr>
+        <p:blipFill>
+          <a:blip r:embed="rId4"/>
+          <a:stretch>
+            <a:fillRect/>
+          </a:stretch>
+        </p:blipFill>
+        <p:spPr>
+          <a:xfrm>
+            <a:off x="8682041" y="910771"/>
+            <a:ext cx="3009660" cy="2888116"/>
+          </a:xfrm>
+          <a:prstGeom prst="rect">
+            <a:avLst/>
+          </a:prstGeom>
+        </p:spPr>
+      </p:pic>
     </p:spTree>
     <p:extLst>
       <p:ext uri="{BB962C8B-B14F-4D97-AF65-F5344CB8AC3E}">
@@ -7473,6 +7837,81 @@
   <p:clrMapOvr>
     <a:masterClrMapping/>
   </p:clrMapOvr>
+  <p:timing>
+    <p:tnLst>
+      <p:par>
+        <p:cTn id="1" dur="indefinite" restart="never" nodeType="tmRoot">
+          <p:childTnLst>
+            <p:seq concurrent="1" nextAc="seek">
+              <p:cTn id="2" dur="indefinite" nodeType="mainSeq">
+                <p:childTnLst>
+                  <p:par>
+                    <p:cTn id="3" fill="hold">
+                      <p:stCondLst>
+                        <p:cond delay="indefinite"/>
+                      </p:stCondLst>
+                      <p:childTnLst>
+                        <p:par>
+                          <p:cTn id="4" fill="hold">
+                            <p:stCondLst>
+                              <p:cond delay="0"/>
+                            </p:stCondLst>
+                            <p:childTnLst>
+                              <p:par>
+                                <p:cTn id="5" presetID="1" presetClass="entr" presetSubtype="0" fill="hold" nodeType="clickEffect">
+                                  <p:stCondLst>
+                                    <p:cond delay="0"/>
+                                  </p:stCondLst>
+                                  <p:childTnLst>
+                                    <p:set>
+                                      <p:cBhvr>
+                                        <p:cTn id="6" dur="1" fill="hold">
+                                          <p:stCondLst>
+                                            <p:cond delay="0"/>
+                                          </p:stCondLst>
+                                        </p:cTn>
+                                        <p:tgtEl>
+                                          <p:spTgt spid="4"/>
+                                        </p:tgtEl>
+                                        <p:attrNameLst>
+                                          <p:attrName>style.visibility</p:attrName>
+                                        </p:attrNameLst>
+                                      </p:cBhvr>
+                                      <p:to>
+                                        <p:strVal val="visible"/>
+                                      </p:to>
+                                    </p:set>
+                                  </p:childTnLst>
+                                </p:cTn>
+                              </p:par>
+                            </p:childTnLst>
+                          </p:cTn>
+                        </p:par>
+                      </p:childTnLst>
+                    </p:cTn>
+                  </p:par>
+                </p:childTnLst>
+              </p:cTn>
+              <p:prevCondLst>
+                <p:cond evt="onPrev" delay="0">
+                  <p:tgtEl>
+                    <p:sldTgt/>
+                  </p:tgtEl>
+                </p:cond>
+              </p:prevCondLst>
+              <p:nextCondLst>
+                <p:cond evt="onNext" delay="0">
+                  <p:tgtEl>
+                    <p:sldTgt/>
+                  </p:tgtEl>
+                </p:cond>
+              </p:nextCondLst>
+            </p:seq>
+          </p:childTnLst>
+        </p:cTn>
+      </p:par>
+    </p:tnLst>
+  </p:timing>
 </p:sld>
 </file>
 
@@ -7824,6 +8263,90 @@
           </a:p>
         </p:txBody>
       </p:sp>
+      <p:sp>
+        <p:nvSpPr>
+          <p:cNvPr id="3" name="Title 1">
+            <a:extLst>
+              <a:ext uri="{FF2B5EF4-FFF2-40B4-BE49-F238E27FC236}">
+                <a16:creationId xmlns:a16="http://schemas.microsoft.com/office/drawing/2014/main" id="{35C27704-B8A1-C170-65D2-1CEB000E0563}"/>
+              </a:ext>
+            </a:extLst>
+          </p:cNvPr>
+          <p:cNvSpPr txBox="1">
+            <a:spLocks/>
+          </p:cNvSpPr>
+          <p:nvPr/>
+        </p:nvSpPr>
+        <p:spPr>
+          <a:xfrm>
+            <a:off x="2707776" y="5526881"/>
+            <a:ext cx="10515600" cy="1325563"/>
+          </a:xfrm>
+          <a:prstGeom prst="rect">
+            <a:avLst/>
+          </a:prstGeom>
+        </p:spPr>
+        <p:txBody>
+          <a:bodyPr vert="horz" lIns="91440" tIns="45720" rIns="91440" bIns="45720" rtlCol="0" anchor="ctr">
+            <a:normAutofit/>
+          </a:bodyPr>
+          <a:lstStyle>
+            <a:lvl1pPr algn="l" defTabSz="914400" rtl="0" eaLnBrk="1" latinLnBrk="0" hangingPunct="1">
+              <a:lnSpc>
+                <a:spcPct val="90000"/>
+              </a:lnSpc>
+              <a:spcBef>
+                <a:spcPct val="0"/>
+              </a:spcBef>
+              <a:buNone/>
+              <a:defRPr sz="4400" kern="1200">
+                <a:solidFill>
+                  <a:schemeClr val="tx1"/>
+                </a:solidFill>
+                <a:latin typeface="+mj-lt"/>
+                <a:ea typeface="+mj-ea"/>
+                <a:cs typeface="+mj-cs"/>
+              </a:defRPr>
+            </a:lvl1pPr>
+          </a:lstStyle>
+          <a:p>
+            <a:r>
+              <a:rPr lang="en-US" sz="3200" dirty="0"/>
+              <a:t>But really they are basically the same thing…</a:t>
+            </a:r>
+          </a:p>
+        </p:txBody>
+      </p:sp>
+      <p:pic>
+        <p:nvPicPr>
+          <p:cNvPr id="8" name="Picture 7">
+            <a:extLst>
+              <a:ext uri="{FF2B5EF4-FFF2-40B4-BE49-F238E27FC236}">
+                <a16:creationId xmlns:a16="http://schemas.microsoft.com/office/drawing/2014/main" id="{8634AFBD-9A31-FDCA-4EA2-535BE53F8944}"/>
+              </a:ext>
+            </a:extLst>
+          </p:cNvPr>
+          <p:cNvPicPr>
+            <a:picLocks noChangeAspect="1"/>
+          </p:cNvPicPr>
+          <p:nvPr/>
+        </p:nvPicPr>
+        <p:blipFill>
+          <a:blip r:embed="rId2"/>
+          <a:stretch>
+            <a:fillRect/>
+          </a:stretch>
+        </p:blipFill>
+        <p:spPr>
+          <a:xfrm>
+            <a:off x="8436428" y="3611585"/>
+            <a:ext cx="3302726" cy="2201817"/>
+          </a:xfrm>
+          <a:prstGeom prst="rect">
+            <a:avLst/>
+          </a:prstGeom>
+        </p:spPr>
+      </p:pic>
     </p:spTree>
     <p:extLst>
       <p:ext uri="{BB962C8B-B14F-4D97-AF65-F5344CB8AC3E}">
@@ -7834,6 +8357,119 @@
   <p:clrMapOvr>
     <a:masterClrMapping/>
   </p:clrMapOvr>
+  <p:timing>
+    <p:tnLst>
+      <p:par>
+        <p:cTn id="1" dur="indefinite" restart="never" nodeType="tmRoot">
+          <p:childTnLst>
+            <p:seq concurrent="1" nextAc="seek">
+              <p:cTn id="2" dur="indefinite" nodeType="mainSeq">
+                <p:childTnLst>
+                  <p:par>
+                    <p:cTn id="3" fill="hold">
+                      <p:stCondLst>
+                        <p:cond delay="indefinite"/>
+                      </p:stCondLst>
+                      <p:childTnLst>
+                        <p:par>
+                          <p:cTn id="4" fill="hold">
+                            <p:stCondLst>
+                              <p:cond delay="0"/>
+                            </p:stCondLst>
+                            <p:childTnLst>
+                              <p:par>
+                                <p:cTn id="5" presetID="1" presetClass="entr" presetSubtype="0" fill="hold" grpId="0" nodeType="clickEffect">
+                                  <p:stCondLst>
+                                    <p:cond delay="0"/>
+                                  </p:stCondLst>
+                                  <p:childTnLst>
+                                    <p:set>
+                                      <p:cBhvr>
+                                        <p:cTn id="6" dur="1" fill="hold">
+                                          <p:stCondLst>
+                                            <p:cond delay="0"/>
+                                          </p:stCondLst>
+                                        </p:cTn>
+                                        <p:tgtEl>
+                                          <p:spTgt spid="3"/>
+                                        </p:tgtEl>
+                                        <p:attrNameLst>
+                                          <p:attrName>style.visibility</p:attrName>
+                                        </p:attrNameLst>
+                                      </p:cBhvr>
+                                      <p:to>
+                                        <p:strVal val="visible"/>
+                                      </p:to>
+                                    </p:set>
+                                  </p:childTnLst>
+                                </p:cTn>
+                              </p:par>
+                              <p:par>
+                                <p:cTn id="7" presetID="10" presetClass="entr" presetSubtype="0" fill="hold" nodeType="withEffect">
+                                  <p:stCondLst>
+                                    <p:cond delay="0"/>
+                                  </p:stCondLst>
+                                  <p:childTnLst>
+                                    <p:set>
+                                      <p:cBhvr>
+                                        <p:cTn id="8" dur="1" fill="hold">
+                                          <p:stCondLst>
+                                            <p:cond delay="0"/>
+                                          </p:stCondLst>
+                                        </p:cTn>
+                                        <p:tgtEl>
+                                          <p:spTgt spid="8"/>
+                                        </p:tgtEl>
+                                        <p:attrNameLst>
+                                          <p:attrName>style.visibility</p:attrName>
+                                        </p:attrNameLst>
+                                      </p:cBhvr>
+                                      <p:to>
+                                        <p:strVal val="visible"/>
+                                      </p:to>
+                                    </p:set>
+                                    <p:animEffect transition="in" filter="fade">
+                                      <p:cBhvr>
+                                        <p:cTn id="9" dur="500"/>
+                                        <p:tgtEl>
+                                          <p:spTgt spid="8"/>
+                                        </p:tgtEl>
+                                      </p:cBhvr>
+                                    </p:animEffect>
+                                  </p:childTnLst>
+                                </p:cTn>
+                              </p:par>
+                            </p:childTnLst>
+                          </p:cTn>
+                        </p:par>
+                      </p:childTnLst>
+                    </p:cTn>
+                  </p:par>
+                </p:childTnLst>
+              </p:cTn>
+              <p:prevCondLst>
+                <p:cond evt="onPrev" delay="0">
+                  <p:tgtEl>
+                    <p:sldTgt/>
+                  </p:tgtEl>
+                </p:cond>
+              </p:prevCondLst>
+              <p:nextCondLst>
+                <p:cond evt="onNext" delay="0">
+                  <p:tgtEl>
+                    <p:sldTgt/>
+                  </p:tgtEl>
+                </p:cond>
+              </p:nextCondLst>
+            </p:seq>
+          </p:childTnLst>
+        </p:cTn>
+      </p:par>
+    </p:tnLst>
+    <p:bldLst>
+      <p:bldP spid="3" grpId="0"/>
+    </p:bldLst>
+  </p:timing>
 </p:sld>
 </file>
 
@@ -7956,6 +8592,58 @@
           </a:ln>
         </p:spPr>
       </p:pic>
+      <p:sp>
+        <p:nvSpPr>
+          <p:cNvPr id="3" name="Oval 2">
+            <a:extLst>
+              <a:ext uri="{FF2B5EF4-FFF2-40B4-BE49-F238E27FC236}">
+                <a16:creationId xmlns:a16="http://schemas.microsoft.com/office/drawing/2014/main" id="{08171129-227A-685F-2FD6-223B39727D11}"/>
+              </a:ext>
+            </a:extLst>
+          </p:cNvPr>
+          <p:cNvSpPr/>
+          <p:nvPr/>
+        </p:nvSpPr>
+        <p:spPr>
+          <a:xfrm>
+            <a:off x="938469" y="2264228"/>
+            <a:ext cx="1538977" cy="473271"/>
+          </a:xfrm>
+          <a:prstGeom prst="ellipse">
+            <a:avLst/>
+          </a:prstGeom>
+          <a:noFill/>
+          <a:ln>
+            <a:solidFill>
+              <a:srgbClr val="FF0000"/>
+            </a:solidFill>
+          </a:ln>
+        </p:spPr>
+        <p:style>
+          <a:lnRef idx="2">
+            <a:schemeClr val="accent1">
+              <a:shade val="15000"/>
+            </a:schemeClr>
+          </a:lnRef>
+          <a:fillRef idx="1">
+            <a:schemeClr val="accent1"/>
+          </a:fillRef>
+          <a:effectRef idx="0">
+            <a:schemeClr val="accent1"/>
+          </a:effectRef>
+          <a:fontRef idx="minor">
+            <a:schemeClr val="lt1"/>
+          </a:fontRef>
+        </p:style>
+        <p:txBody>
+          <a:bodyPr rtlCol="0" anchor="ctr"/>
+          <a:lstStyle/>
+          <a:p>
+            <a:pPr algn="ctr"/>
+            <a:endParaRPr lang="en-US"/>
+          </a:p>
+        </p:txBody>
+      </p:sp>
     </p:spTree>
     <p:extLst>
       <p:ext uri="{BB962C8B-B14F-4D97-AF65-F5344CB8AC3E}">
@@ -7966,6 +8654,81 @@
   <p:clrMapOvr>
     <a:masterClrMapping/>
   </p:clrMapOvr>
+  <p:timing>
+    <p:tnLst>
+      <p:par>
+        <p:cTn id="1" dur="indefinite" restart="never" nodeType="tmRoot">
+          <p:childTnLst>
+            <p:seq concurrent="1" nextAc="seek">
+              <p:cTn id="2" dur="indefinite" nodeType="mainSeq">
+                <p:childTnLst>
+                  <p:par>
+                    <p:cTn id="3" fill="hold">
+                      <p:stCondLst>
+                        <p:cond delay="indefinite"/>
+                      </p:stCondLst>
+                      <p:childTnLst>
+                        <p:par>
+                          <p:cTn id="4" fill="hold">
+                            <p:stCondLst>
+                              <p:cond delay="0"/>
+                            </p:stCondLst>
+                            <p:childTnLst>
+                              <p:par>
+                                <p:cTn id="5" presetID="1" presetClass="entr" presetSubtype="0" fill="hold" nodeType="clickEffect">
+                                  <p:stCondLst>
+                                    <p:cond delay="0"/>
+                                  </p:stCondLst>
+                                  <p:childTnLst>
+                                    <p:set>
+                                      <p:cBhvr>
+                                        <p:cTn id="6" dur="1" fill="hold">
+                                          <p:stCondLst>
+                                            <p:cond delay="0"/>
+                                          </p:stCondLst>
+                                        </p:cTn>
+                                        <p:tgtEl>
+                                          <p:spTgt spid="9"/>
+                                        </p:tgtEl>
+                                        <p:attrNameLst>
+                                          <p:attrName>style.visibility</p:attrName>
+                                        </p:attrNameLst>
+                                      </p:cBhvr>
+                                      <p:to>
+                                        <p:strVal val="visible"/>
+                                      </p:to>
+                                    </p:set>
+                                  </p:childTnLst>
+                                </p:cTn>
+                              </p:par>
+                            </p:childTnLst>
+                          </p:cTn>
+                        </p:par>
+                      </p:childTnLst>
+                    </p:cTn>
+                  </p:par>
+                </p:childTnLst>
+              </p:cTn>
+              <p:prevCondLst>
+                <p:cond evt="onPrev" delay="0">
+                  <p:tgtEl>
+                    <p:sldTgt/>
+                  </p:tgtEl>
+                </p:cond>
+              </p:prevCondLst>
+              <p:nextCondLst>
+                <p:cond evt="onNext" delay="0">
+                  <p:tgtEl>
+                    <p:sldTgt/>
+                  </p:tgtEl>
+                </p:cond>
+              </p:nextCondLst>
+            </p:seq>
+          </p:childTnLst>
+        </p:cTn>
+      </p:par>
+    </p:tnLst>
+  </p:timing>
 </p:sld>
 </file>
 
@@ -8564,7 +9327,12 @@
             <p:ph idx="1"/>
           </p:nvPr>
         </p:nvSpPr>
-        <p:spPr/>
+        <p:spPr>
+          <a:xfrm>
+            <a:off x="838200" y="1825625"/>
+            <a:ext cx="5031377" cy="4351338"/>
+          </a:xfrm>
+        </p:spPr>
         <p:txBody>
           <a:bodyPr/>
           <a:lstStyle/>
@@ -8581,9 +9349,9 @@
           <a:p>
             <a:r>
               <a:rPr lang="en-US" dirty="0">
-                <a:hlinkClick r:id="rId2"/>
+                <a:hlinkClick r:id="rId3"/>
               </a:rPr>
-              <a:t>https://www.rstudio.com/wp-content/uploads/2015/03/rmarkdown-reference.pdf</a:t>
+              <a:t>https://quarto.org/docs/authoring/markdown-basics.html</a:t>
             </a:r>
             <a:r>
               <a:rPr lang="en-US" dirty="0"/>
@@ -8605,6 +9373,170 @@
           </a:p>
           <a:p>
             <a:endParaRPr lang="en-US" dirty="0"/>
+          </a:p>
+        </p:txBody>
+      </p:sp>
+      <p:pic>
+        <p:nvPicPr>
+          <p:cNvPr id="1026" name="Picture 2" descr="Grumpy Cat (@RealGrumpyCat) | Grumpy cat cartoon, Cat drawing, Cats  illustration">
+            <a:extLst>
+              <a:ext uri="{FF2B5EF4-FFF2-40B4-BE49-F238E27FC236}">
+                <a16:creationId xmlns:a16="http://schemas.microsoft.com/office/drawing/2014/main" id="{8678177D-6E79-8B90-9AAF-3C4921C500DC}"/>
+              </a:ext>
+            </a:extLst>
+          </p:cNvPr>
+          <p:cNvPicPr>
+            <a:picLocks noChangeAspect="1" noChangeArrowheads="1"/>
+          </p:cNvPicPr>
+          <p:nvPr/>
+        </p:nvPicPr>
+        <p:blipFill>
+          <a:blip r:embed="rId4">
+            <a:extLst>
+              <a:ext uri="{28A0092B-C50C-407E-A947-70E740481C1C}">
+                <a14:useLocalDpi xmlns:a14="http://schemas.microsoft.com/office/drawing/2010/main" val="0"/>
+              </a:ext>
+            </a:extLst>
+          </a:blip>
+          <a:srcRect/>
+          <a:stretch>
+            <a:fillRect/>
+          </a:stretch>
+        </p:blipFill>
+        <p:spPr bwMode="auto">
+          <a:xfrm>
+            <a:off x="8281807" y="1480820"/>
+            <a:ext cx="2020433" cy="2020433"/>
+          </a:xfrm>
+          <a:prstGeom prst="rect">
+            <a:avLst/>
+          </a:prstGeom>
+          <a:noFill/>
+          <a:extLst>
+            <a:ext uri="{909E8E84-426E-40DD-AFC4-6F175D3DCCD1}">
+              <a14:hiddenFill xmlns:a14="http://schemas.microsoft.com/office/drawing/2010/main">
+                <a:solidFill>
+                  <a:srgbClr val="FFFFFF"/>
+                </a:solidFill>
+              </a14:hiddenFill>
+            </a:ext>
+          </a:extLst>
+        </p:spPr>
+      </p:pic>
+      <p:pic>
+        <p:nvPicPr>
+          <p:cNvPr id="1028" name="Picture 4" descr="Grumpy Cat dead: Internet sensation, Worst Christmas Ever movie star dies  at 7">
+            <a:extLst>
+              <a:ext uri="{FF2B5EF4-FFF2-40B4-BE49-F238E27FC236}">
+                <a16:creationId xmlns:a16="http://schemas.microsoft.com/office/drawing/2014/main" id="{5FC04EBA-DBD3-60B5-1594-62EA1CB9B7E7}"/>
+              </a:ext>
+            </a:extLst>
+          </p:cNvPr>
+          <p:cNvPicPr>
+            <a:picLocks noChangeAspect="1" noChangeArrowheads="1"/>
+          </p:cNvPicPr>
+          <p:nvPr/>
+        </p:nvPicPr>
+        <p:blipFill>
+          <a:blip r:embed="rId5">
+            <a:extLst>
+              <a:ext uri="{28A0092B-C50C-407E-A947-70E740481C1C}">
+                <a14:useLocalDpi xmlns:a14="http://schemas.microsoft.com/office/drawing/2010/main" val="0"/>
+              </a:ext>
+            </a:extLst>
+          </a:blip>
+          <a:srcRect/>
+          <a:stretch>
+            <a:fillRect/>
+          </a:stretch>
+        </p:blipFill>
+        <p:spPr bwMode="auto">
+          <a:xfrm>
+            <a:off x="8281807" y="3941853"/>
+            <a:ext cx="2020433" cy="1885563"/>
+          </a:xfrm>
+          <a:prstGeom prst="rect">
+            <a:avLst/>
+          </a:prstGeom>
+          <a:noFill/>
+          <a:extLst>
+            <a:ext uri="{909E8E84-426E-40DD-AFC4-6F175D3DCCD1}">
+              <a14:hiddenFill xmlns:a14="http://schemas.microsoft.com/office/drawing/2010/main">
+                <a:solidFill>
+                  <a:srgbClr val="FFFFFF"/>
+                </a:solidFill>
+              </a14:hiddenFill>
+            </a:ext>
+          </a:extLst>
+        </p:spPr>
+      </p:pic>
+      <p:sp>
+        <p:nvSpPr>
+          <p:cNvPr id="3" name="TextBox 2">
+            <a:extLst>
+              <a:ext uri="{FF2B5EF4-FFF2-40B4-BE49-F238E27FC236}">
+                <a16:creationId xmlns:a16="http://schemas.microsoft.com/office/drawing/2014/main" id="{DE0E9304-ED1C-1AA2-200B-B0F33515D444}"/>
+              </a:ext>
+            </a:extLst>
+          </p:cNvPr>
+          <p:cNvSpPr txBox="1"/>
+          <p:nvPr/>
+        </p:nvSpPr>
+        <p:spPr>
+          <a:xfrm>
+            <a:off x="8940003" y="1296154"/>
+            <a:ext cx="704039" cy="369332"/>
+          </a:xfrm>
+          <a:prstGeom prst="rect">
+            <a:avLst/>
+          </a:prstGeom>
+          <a:noFill/>
+        </p:spPr>
+        <p:txBody>
+          <a:bodyPr wrap="none" rtlCol="0">
+            <a:spAutoFit/>
+          </a:bodyPr>
+          <a:lstStyle/>
+          <a:p>
+            <a:r>
+              <a:rPr lang="en-US" dirty="0"/>
+              <a:t>Input</a:t>
+            </a:r>
+          </a:p>
+        </p:txBody>
+      </p:sp>
+      <p:sp>
+        <p:nvSpPr>
+          <p:cNvPr id="4" name="TextBox 3">
+            <a:extLst>
+              <a:ext uri="{FF2B5EF4-FFF2-40B4-BE49-F238E27FC236}">
+                <a16:creationId xmlns:a16="http://schemas.microsoft.com/office/drawing/2014/main" id="{00FA55EC-7856-36AE-225B-84CAAB44749B}"/>
+              </a:ext>
+            </a:extLst>
+          </p:cNvPr>
+          <p:cNvSpPr txBox="1"/>
+          <p:nvPr/>
+        </p:nvSpPr>
+        <p:spPr>
+          <a:xfrm>
+            <a:off x="8940002" y="3572521"/>
+            <a:ext cx="889987" cy="369332"/>
+          </a:xfrm>
+          <a:prstGeom prst="rect">
+            <a:avLst/>
+          </a:prstGeom>
+          <a:noFill/>
+        </p:spPr>
+        <p:txBody>
+          <a:bodyPr wrap="none" rtlCol="0">
+            <a:spAutoFit/>
+          </a:bodyPr>
+          <a:lstStyle/>
+          <a:p>
+            <a:r>
+              <a:rPr lang="en-US" dirty="0"/>
+              <a:t>Output</a:t>
+            </a:r>
           </a:p>
         </p:txBody>
       </p:sp>
@@ -8927,7 +9859,7 @@
         </p:blipFill>
         <p:spPr>
           <a:xfrm>
-            <a:off x="6072445" y="1488833"/>
+            <a:off x="6020194" y="1488833"/>
             <a:ext cx="4945051" cy="4832022"/>
           </a:xfrm>
           <a:prstGeom prst="rect">
@@ -8940,6 +9872,110 @@
           </a:ln>
         </p:spPr>
       </p:pic>
+      <p:sp>
+        <p:nvSpPr>
+          <p:cNvPr id="4" name="Oval 3">
+            <a:extLst>
+              <a:ext uri="{FF2B5EF4-FFF2-40B4-BE49-F238E27FC236}">
+                <a16:creationId xmlns:a16="http://schemas.microsoft.com/office/drawing/2014/main" id="{172C8F02-2A74-ED1E-743D-689F2118135F}"/>
+              </a:ext>
+            </a:extLst>
+          </p:cNvPr>
+          <p:cNvSpPr/>
+          <p:nvPr/>
+        </p:nvSpPr>
+        <p:spPr>
+          <a:xfrm>
+            <a:off x="754353" y="1858165"/>
+            <a:ext cx="400594" cy="369332"/>
+          </a:xfrm>
+          <a:prstGeom prst="ellipse">
+            <a:avLst/>
+          </a:prstGeom>
+          <a:noFill/>
+          <a:ln>
+            <a:solidFill>
+              <a:srgbClr val="FF0000"/>
+            </a:solidFill>
+          </a:ln>
+        </p:spPr>
+        <p:style>
+          <a:lnRef idx="2">
+            <a:schemeClr val="accent1">
+              <a:shade val="15000"/>
+            </a:schemeClr>
+          </a:lnRef>
+          <a:fillRef idx="1">
+            <a:schemeClr val="accent1"/>
+          </a:fillRef>
+          <a:effectRef idx="0">
+            <a:schemeClr val="accent1"/>
+          </a:effectRef>
+          <a:fontRef idx="minor">
+            <a:schemeClr val="lt1"/>
+          </a:fontRef>
+        </p:style>
+        <p:txBody>
+          <a:bodyPr rtlCol="0" anchor="ctr"/>
+          <a:lstStyle/>
+          <a:p>
+            <a:pPr algn="ctr"/>
+            <a:endParaRPr lang="en-US"/>
+          </a:p>
+        </p:txBody>
+      </p:sp>
+      <p:sp>
+        <p:nvSpPr>
+          <p:cNvPr id="5" name="Oval 4">
+            <a:extLst>
+              <a:ext uri="{FF2B5EF4-FFF2-40B4-BE49-F238E27FC236}">
+                <a16:creationId xmlns:a16="http://schemas.microsoft.com/office/drawing/2014/main" id="{21CEC41D-3224-D983-8516-F476E309972B}"/>
+              </a:ext>
+            </a:extLst>
+          </p:cNvPr>
+          <p:cNvSpPr/>
+          <p:nvPr/>
+        </p:nvSpPr>
+        <p:spPr>
+          <a:xfrm>
+            <a:off x="6541199" y="1854254"/>
+            <a:ext cx="400594" cy="369332"/>
+          </a:xfrm>
+          <a:prstGeom prst="ellipse">
+            <a:avLst/>
+          </a:prstGeom>
+          <a:noFill/>
+          <a:ln>
+            <a:solidFill>
+              <a:srgbClr val="FF0000"/>
+            </a:solidFill>
+          </a:ln>
+        </p:spPr>
+        <p:style>
+          <a:lnRef idx="2">
+            <a:schemeClr val="accent1">
+              <a:shade val="15000"/>
+            </a:schemeClr>
+          </a:lnRef>
+          <a:fillRef idx="1">
+            <a:schemeClr val="accent1"/>
+          </a:fillRef>
+          <a:effectRef idx="0">
+            <a:schemeClr val="accent1"/>
+          </a:effectRef>
+          <a:fontRef idx="minor">
+            <a:schemeClr val="lt1"/>
+          </a:fontRef>
+        </p:style>
+        <p:txBody>
+          <a:bodyPr rtlCol="0" anchor="ctr"/>
+          <a:lstStyle/>
+          <a:p>
+            <a:pPr algn="ctr"/>
+            <a:endParaRPr lang="en-US"/>
+          </a:p>
+        </p:txBody>
+      </p:sp>
     </p:spTree>
     <p:extLst>
       <p:ext uri="{BB962C8B-B14F-4D97-AF65-F5344CB8AC3E}">
@@ -8962,9 +9998,6 @@
                     <p:cTn id="3" fill="hold">
                       <p:stCondLst>
                         <p:cond delay="indefinite"/>
-                        <p:cond evt="onBegin" delay="0">
-                          <p:tn val="2"/>
-                        </p:cond>
                       </p:stCondLst>
                       <p:childTnLst>
                         <p:par>
@@ -8974,7 +10007,7 @@
                             </p:stCondLst>
                             <p:childTnLst>
                               <p:par>
-                                <p:cTn id="5" presetID="1" presetClass="entr" presetSubtype="0" fill="hold" grpId="0" nodeType="withEffect">
+                                <p:cTn id="5" presetID="1" presetClass="entr" presetSubtype="0" fill="hold" grpId="0" nodeType="clickEffect">
                                   <p:stCondLst>
                                     <p:cond delay="0"/>
                                   </p:stCondLst>
@@ -8988,6 +10021,60 @@
                                         </p:cTn>
                                         <p:tgtEl>
                                           <p:spTgt spid="9"/>
+                                        </p:tgtEl>
+                                        <p:attrNameLst>
+                                          <p:attrName>style.visibility</p:attrName>
+                                        </p:attrNameLst>
+                                      </p:cBhvr>
+                                      <p:to>
+                                        <p:strVal val="visible"/>
+                                      </p:to>
+                                    </p:set>
+                                  </p:childTnLst>
+                                </p:cTn>
+                              </p:par>
+                              <p:par>
+                                <p:cTn id="7" presetID="1" presetClass="entr" presetSubtype="0" fill="hold" nodeType="withEffect">
+                                  <p:stCondLst>
+                                    <p:cond delay="0"/>
+                                  </p:stCondLst>
+                                  <p:childTnLst>
+                                    <p:set>
+                                      <p:cBhvr>
+                                        <p:cTn id="8" dur="1" fill="hold">
+                                          <p:stCondLst>
+                                            <p:cond delay="0"/>
+                                          </p:stCondLst>
+                                        </p:cTn>
+                                        <p:tgtEl>
+                                          <p:spTgt spid="11"/>
+                                        </p:tgtEl>
+                                        <p:attrNameLst>
+                                          <p:attrName>style.visibility</p:attrName>
+                                        </p:attrNameLst>
+                                      </p:cBhvr>
+                                      <p:to>
+                                        <p:strVal val="visible"/>
+                                      </p:to>
+                                    </p:set>
+                                  </p:childTnLst>
+                                </p:cTn>
+                              </p:par>
+                              <p:par>
+                                <p:cTn id="9" presetID="1" presetClass="entr" presetSubtype="0" fill="hold" grpId="0" nodeType="withEffect">
+                                  <p:stCondLst>
+                                    <p:cond delay="0"/>
+                                  </p:stCondLst>
+                                  <p:childTnLst>
+                                    <p:set>
+                                      <p:cBhvr>
+                                        <p:cTn id="10" dur="1" fill="hold">
+                                          <p:stCondLst>
+                                            <p:cond delay="0"/>
+                                          </p:stCondLst>
+                                        </p:cTn>
+                                        <p:tgtEl>
+                                          <p:spTgt spid="5"/>
                                         </p:tgtEl>
                                         <p:attrNameLst>
                                           <p:attrName>style.visibility</p:attrName>
@@ -9029,6 +10116,7 @@
     </p:tnLst>
     <p:bldLst>
       <p:bldP spid="9" grpId="0"/>
+      <p:bldP spid="5" grpId="0" animBg="1"/>
     </p:bldLst>
   </p:timing>
 </p:sld>

</xml_diff>